<commit_message>
Fixed mentions of animal learning
</commit_message>
<xml_diff>
--- a/Poster_1_v3.pptx
+++ b/Poster_1_v3.pptx
@@ -12,10 +12,10 @@
   <p:embeddedFontLst>
     <p:embeddedFont>
       <p:font typeface="Amaranth" panose="02000503050000020004" pitchFamily="2" charset="77"/>
-      <p:regular r:id=""/>
-      <p:bold r:id=""/>
-      <p:italic r:id=""/>
-      <p:boldItalic r:id=""/>
+      <p:regular r:id="rId3"/>
+      <p:bold r:id="rId3"/>
+      <p:italic r:id="rId3"/>
+      <p:boldItalic r:id="rId3"/>
     </p:embeddedFont>
     <p:embeddedFont>
       <p:font typeface="Apple Braille" pitchFamily="2" charset="0"/>
@@ -4557,14 +4557,14 @@
                 <a:latin typeface="Times New Roman" panose="02020603050405020304" pitchFamily="18" charset="0"/>
                 <a:cs typeface="Times New Roman" panose="02020603050405020304" pitchFamily="18" charset="0"/>
               </a:rPr>
-              <a:t>sound recognition systems still struggle with animal vocalizations</a:t>
+              <a:t>sound recognition systems struggle with environmental sounds, </a:t>
             </a:r>
             <a:r>
               <a:rPr lang="en-CA" sz="3000" dirty="0">
                 <a:latin typeface="Times New Roman" panose="02020603050405020304" pitchFamily="18" charset="0"/>
                 <a:cs typeface="Times New Roman" panose="02020603050405020304" pitchFamily="18" charset="0"/>
               </a:rPr>
-              <a:t>. Building custom deep networks requires more data than most field recordings provide, models either overfit or ignore rare classes.</a:t>
+              <a:t>such as animal vocalizations. Building custom deep networks requires more data than most field recordings provide, models either overfit or ignore rare classes.</a:t>
             </a:r>
             <a:endParaRPr lang="en-US" sz="3000" b="1" dirty="0">
               <a:latin typeface="Times New Roman" panose="02020603050405020304" pitchFamily="18" charset="0"/>
@@ -4833,7 +4833,7 @@
                 <a:latin typeface="Times New Roman" panose="02020603050405020304" pitchFamily="18" charset="0"/>
                 <a:cs typeface="Times New Roman" panose="02020603050405020304" pitchFamily="18" charset="0"/>
               </a:rPr>
-              <a:t>transfer them to ESC-50 animal sounds </a:t>
+              <a:t>transfer them to ESC-50 environmental sounds </a:t>
             </a:r>
             <a:r>
               <a:rPr lang="en-CA" sz="3000" dirty="0">
@@ -5294,8 +5294,8 @@
         </p:nvSpPr>
         <p:spPr>
           <a:xfrm>
-            <a:off x="13159225" y="4939536"/>
-            <a:ext cx="3511153" cy="3831818"/>
+            <a:off x="13159225" y="5036166"/>
+            <a:ext cx="3511153" cy="3416320"/>
           </a:xfrm>
           <a:prstGeom prst="rect">
             <a:avLst/>
@@ -5327,7 +5327,7 @@
                 <a:latin typeface="Times New Roman" panose="02020603050405020304" pitchFamily="18" charset="0"/>
                 <a:cs typeface="Times New Roman" panose="02020603050405020304" pitchFamily="18" charset="0"/>
               </a:rPr>
-              <a:t>: train each classifier only on GTZAN embeddings, freeze it, and evaluate directly on the ESC-50 animal subset without seeing any target labels to measure domain transfer.</a:t>
+              <a:t>: train each classifier only on GTZAN embeddings, freeze it, and evaluate directly on the ESC-50 without seeing any target labels to measure domain transfer.</a:t>
             </a:r>
           </a:p>
         </p:txBody>
@@ -5914,7 +5914,7 @@
             </a:r>
             <a:r>
               <a:rPr lang="en-CA" sz="3000" b="0" dirty="0"/>
-              <a:t>Frozen YAMNet embeddings plus lightweight heads can deliver strong animal-sound recognition: zero-shot is weak, but even 5 labeled clips/class push macro-F1 above 0.6 and full ESC-50 fine-tuning exceeds 0.85.</a:t>
+              <a:t>Frozen YAMNet embeddings plus lightweight heads can deliver strong recognition: zero-shot is weak, but even 5 labeled clips/class push macro-F1 above 0.6 and full ESC-50 fine-tuning exceeds 0.85.</a:t>
             </a:r>
             <a:endParaRPr lang="en-US" sz="3000" b="0" dirty="0"/>
           </a:p>
@@ -6073,7 +6073,7 @@
                 <a:latin typeface="Times New Roman" panose="02020603050405020304" pitchFamily="18" charset="0"/>
                 <a:cs typeface="Times New Roman" panose="02020603050405020304" pitchFamily="18" charset="0"/>
               </a:rPr>
-              <a:t>results may not generalize to other animal sound distributions </a:t>
+              <a:t>results may not generalize to other environmental sound distributions </a:t>
             </a:r>
             <a:r>
               <a:rPr lang="en-CA" sz="3000" dirty="0">

</xml_diff>